<commit_message>
Added a slide about color term data to "creating an obs package"
</commit_message>
<xml_diff>
--- a/documents/creating an obs package.pptx
+++ b/documents/creating an obs package.pptx
@@ -5,7 +5,7 @@
     <p:sldMasterId id="2147483661" r:id="rId1"/>
   </p:sldMasterIdLst>
   <p:handoutMasterIdLst>
-    <p:handoutMasterId r:id="rId15"/>
+    <p:handoutMasterId r:id="rId16"/>
   </p:handoutMasterIdLst>
   <p:sldIdLst>
     <p:sldId id="257" r:id="rId2"/>
@@ -21,6 +21,7 @@
     <p:sldId id="267" r:id="rId12"/>
     <p:sldId id="268" r:id="rId13"/>
     <p:sldId id="269" r:id="rId14"/>
+    <p:sldId id="271" r:id="rId15"/>
   </p:sldIdLst>
   <p:sldSz cx="9144000" cy="6858000" type="screen4x3"/>
   <p:notesSz cx="6858000" cy="9144000"/>
@@ -205,7 +206,7 @@
             <a:fld id="{292420C5-2895-F740-82DD-84BEAA3AC837}" type="datetimeFigureOut">
               <a:rPr lang="en-US" smtClean="0"/>
               <a:pPr/>
-              <a:t>9/30/15</a:t>
+              <a:t>10/1/15</a:t>
             </a:fld>
             <a:endParaRPr lang="en-US"/>
           </a:p>
@@ -2571,6 +2572,229 @@
 </p:sld>
 </file>
 
+<file path=ppt/slides/slide14.xml><?xml version="1.0" encoding="utf-8"?>
+<p:sld xmlns:a="http://schemas.openxmlformats.org/drawingml/2006/main" xmlns:r="http://schemas.openxmlformats.org/officeDocument/2006/relationships" xmlns:p="http://schemas.openxmlformats.org/presentationml/2006/main">
+  <p:cSld>
+    <p:spTree>
+      <p:nvGrpSpPr>
+        <p:cNvPr id="1" name=""/>
+        <p:cNvGrpSpPr/>
+        <p:nvPr/>
+      </p:nvGrpSpPr>
+      <p:grpSpPr>
+        <a:xfrm>
+          <a:off x="0" y="0"/>
+          <a:ext cx="0" cy="0"/>
+          <a:chOff x="0" y="0"/>
+          <a:chExt cx="0" cy="0"/>
+        </a:xfrm>
+      </p:grpSpPr>
+      <p:sp>
+        <p:nvSpPr>
+          <p:cNvPr id="2" name="Title 1"/>
+          <p:cNvSpPr>
+            <a:spLocks noGrp="1"/>
+          </p:cNvSpPr>
+          <p:nvPr>
+            <p:ph type="title"/>
+          </p:nvPr>
+        </p:nvSpPr>
+        <p:spPr/>
+        <p:txBody>
+          <a:bodyPr/>
+          <a:lstStyle/>
+          <a:p>
+            <a:r>
+              <a:rPr lang="en-US" dirty="0" smtClean="0"/>
+              <a:t>Color Term Correction Data</a:t>
+            </a:r>
+            <a:endParaRPr lang="en-US" dirty="0"/>
+          </a:p>
+        </p:txBody>
+      </p:sp>
+      <p:sp>
+        <p:nvSpPr>
+          <p:cNvPr id="3" name="Text Placeholder 2"/>
+          <p:cNvSpPr>
+            <a:spLocks noGrp="1"/>
+          </p:cNvSpPr>
+          <p:nvPr>
+            <p:ph type="body" idx="1"/>
+          </p:nvPr>
+        </p:nvSpPr>
+        <p:spPr/>
+        <p:txBody>
+          <a:bodyPr/>
+          <a:lstStyle/>
+          <a:p>
+            <a:pPr marL="0" indent="0">
+              <a:buNone/>
+            </a:pPr>
+            <a:r>
+              <a:rPr lang="en-US" dirty="0" smtClean="0"/>
+              <a:t>Color term correction data is presently stored in the </a:t>
+            </a:r>
+            <a:r>
+              <a:rPr lang="en-US" dirty="0" err="1" smtClean="0"/>
+              <a:t>config</a:t>
+            </a:r>
+            <a:r>
+              <a:rPr lang="en-US" dirty="0" smtClean="0"/>
+              <a:t> directory as a </a:t>
+            </a:r>
+            <a:r>
+              <a:rPr lang="en-US" dirty="0" err="1" smtClean="0"/>
+              <a:t>config</a:t>
+            </a:r>
+            <a:r>
+              <a:rPr lang="en-US" dirty="0" smtClean="0"/>
+              <a:t> file (one such file per camera).</a:t>
+            </a:r>
+          </a:p>
+          <a:p>
+            <a:pPr marL="0" indent="0">
+              <a:buNone/>
+            </a:pPr>
+            <a:endParaRPr lang="en-US" dirty="0"/>
+          </a:p>
+          <a:p>
+            <a:pPr marL="0" indent="0">
+              <a:buNone/>
+            </a:pPr>
+            <a:r>
+              <a:rPr lang="en-US" dirty="0" smtClean="0"/>
+              <a:t>It is typically stored in a file named </a:t>
+            </a:r>
+            <a:r>
+              <a:rPr lang="en-US" dirty="0" err="1" smtClean="0"/>
+              <a:t>colorterms.py</a:t>
+            </a:r>
+            <a:r>
+              <a:rPr lang="en-US" dirty="0" smtClean="0"/>
+              <a:t> and loaded by </a:t>
+            </a:r>
+            <a:r>
+              <a:rPr lang="en-US" dirty="0" err="1" smtClean="0"/>
+              <a:t>processCcd.py</a:t>
+            </a:r>
+            <a:r>
+              <a:rPr lang="en-US" dirty="0" smtClean="0"/>
+              <a:t>, etc..</a:t>
+            </a:r>
+          </a:p>
+          <a:p>
+            <a:pPr marL="0" indent="0">
+              <a:buNone/>
+            </a:pPr>
+            <a:endParaRPr lang="en-US" dirty="0"/>
+          </a:p>
+          <a:p>
+            <a:pPr marL="0" indent="0">
+              <a:buNone/>
+            </a:pPr>
+            <a:r>
+              <a:rPr lang="en-US" dirty="0" smtClean="0"/>
+              <a:t>Example: </a:t>
+            </a:r>
+            <a:r>
+              <a:rPr lang="en-US" dirty="0" err="1" smtClean="0">
+                <a:hlinkClick r:id="rId2"/>
+              </a:rPr>
+              <a:t>obs_subaru</a:t>
+            </a:r>
+            <a:r>
+              <a:rPr lang="en-US" dirty="0" smtClean="0">
+                <a:hlinkClick r:id="rId2"/>
+              </a:rPr>
+              <a:t>/</a:t>
+            </a:r>
+            <a:r>
+              <a:rPr lang="en-US" dirty="0" err="1" smtClean="0">
+                <a:hlinkClick r:id="rId2"/>
+              </a:rPr>
+              <a:t>config</a:t>
+            </a:r>
+            <a:r>
+              <a:rPr lang="en-US" dirty="0" smtClean="0">
+                <a:hlinkClick r:id="rId2"/>
+              </a:rPr>
+              <a:t>/</a:t>
+            </a:r>
+            <a:r>
+              <a:rPr lang="en-US" dirty="0" err="1" smtClean="0">
+                <a:hlinkClick r:id="rId2"/>
+              </a:rPr>
+              <a:t>hsc</a:t>
+            </a:r>
+            <a:r>
+              <a:rPr lang="en-US" dirty="0" smtClean="0">
+                <a:hlinkClick r:id="rId2"/>
+              </a:rPr>
+              <a:t>/</a:t>
+            </a:r>
+            <a:r>
+              <a:rPr lang="en-US" dirty="0" err="1" smtClean="0">
+                <a:hlinkClick r:id="rId2"/>
+              </a:rPr>
+              <a:t>colorterms.py</a:t>
+            </a:r>
+            <a:endParaRPr lang="en-US" dirty="0" smtClean="0"/>
+          </a:p>
+          <a:p>
+            <a:pPr marL="0" indent="0">
+              <a:buNone/>
+            </a:pPr>
+            <a:r>
+              <a:rPr lang="en-US" dirty="0" smtClean="0"/>
+              <a:t>Is loaded by </a:t>
+            </a:r>
+            <a:r>
+              <a:rPr lang="en-US" dirty="0" err="1" smtClean="0">
+                <a:hlinkClick r:id="rId3"/>
+              </a:rPr>
+              <a:t>obs_subaru</a:t>
+            </a:r>
+            <a:r>
+              <a:rPr lang="en-US" dirty="0" smtClean="0">
+                <a:hlinkClick r:id="rId3"/>
+              </a:rPr>
+              <a:t>/</a:t>
+            </a:r>
+            <a:r>
+              <a:rPr lang="en-US" dirty="0" err="1" smtClean="0">
+                <a:hlinkClick r:id="rId3"/>
+              </a:rPr>
+              <a:t>config</a:t>
+            </a:r>
+            <a:r>
+              <a:rPr lang="en-US" dirty="0" smtClean="0">
+                <a:hlinkClick r:id="rId3"/>
+              </a:rPr>
+              <a:t>/</a:t>
+            </a:r>
+            <a:r>
+              <a:rPr lang="en-US" dirty="0" err="1" smtClean="0">
+                <a:hlinkClick r:id="rId3"/>
+              </a:rPr>
+              <a:t>processCcd.py</a:t>
+            </a:r>
+            <a:endParaRPr lang="en-US" dirty="0"/>
+          </a:p>
+        </p:txBody>
+      </p:sp>
+    </p:spTree>
+    <p:extLst>
+      <p:ext uri="{BB962C8B-B14F-4D97-AF65-F5344CB8AC3E}">
+        <p14:creationId xmlns:p14="http://schemas.microsoft.com/office/powerpoint/2010/main" val="433545995"/>
+      </p:ext>
+    </p:extLst>
+  </p:cSld>
+  <p:clrMapOvr>
+    <a:masterClrMapping/>
+  </p:clrMapOvr>
+</p:sld>
+</file>
+
 <file path=ppt/slides/slide2.xml><?xml version="1.0" encoding="utf-8"?>
 <p:sld xmlns:a="http://schemas.openxmlformats.org/drawingml/2006/main" xmlns:r="http://schemas.openxmlformats.org/officeDocument/2006/relationships" xmlns:p="http://schemas.openxmlformats.org/presentationml/2006/main">
   <p:cSld>
@@ -2647,15 +2871,7 @@
             </a:r>
             <a:r>
               <a:rPr lang="en-US" dirty="0" smtClean="0"/>
-              <a:t>packages provide camera-specific </a:t>
-            </a:r>
-            <a:r>
-              <a:rPr lang="en-US" dirty="0" smtClean="0"/>
-              <a:t>information and code, </a:t>
-            </a:r>
-            <a:r>
-              <a:rPr lang="en-US" dirty="0" smtClean="0"/>
-              <a:t>including:</a:t>
+              <a:t>packages provide camera-specific information and code, including:</a:t>
             </a:r>
           </a:p>
           <a:p>

</xml_diff>

<commit_message>
Fix link errors and typos in "creating an obs package"
</commit_message>
<xml_diff>
--- a/documents/creating an obs package.pptx
+++ b/documents/creating an obs package.pptx
@@ -206,7 +206,7 @@
             <a:fld id="{292420C5-2895-F740-82DD-84BEAA3AC837}" type="datetimeFigureOut">
               <a:rPr lang="en-US" smtClean="0"/>
               <a:pPr/>
-              <a:t>10/1/15</a:t>
+              <a:t>10/6/15</a:t>
             </a:fld>
             <a:endParaRPr lang="en-US"/>
           </a:p>
@@ -2155,19 +2155,7 @@
               <a:rPr lang="en-US" dirty="0" smtClean="0">
                 <a:hlinkClick r:id="rId2"/>
               </a:rPr>
-              <a:t>bin/</a:t>
-            </a:r>
-            <a:r>
-              <a:rPr lang="en-US" dirty="0" err="1" smtClean="0">
-                <a:hlinkClick r:id="rId2"/>
-              </a:rPr>
-              <a:t>genDefectRegistry.py</a:t>
-            </a:r>
-            <a:r>
-              <a:rPr lang="en-US" dirty="0" smtClean="0">
-                <a:hlinkClick r:id="rId2"/>
-              </a:rPr>
-              <a:t> </a:t>
+              <a:t>bin/genDefectRegistry.py </a:t>
             </a:r>
             <a:r>
               <a:rPr lang="en-US" dirty="0" smtClean="0"/>
@@ -2542,14 +2530,33 @@
               <a:rPr lang="en-US" dirty="0">
                 <a:hlinkClick r:id="rId2"/>
               </a:rPr>
-              <a:t>config/processCcd.py and </a:t>
+              <a:t>config/</a:t>
+            </a:r>
+            <a:r>
+              <a:rPr lang="en-US" dirty="0" smtClean="0">
+                <a:hlinkClick r:id="rId3"/>
+              </a:rPr>
+              <a:t>processCcd.py </a:t>
+            </a:r>
+            <a:r>
+              <a:rPr lang="en-US" dirty="0" smtClean="0"/>
+              <a:t>and </a:t>
             </a:r>
             <a:r>
               <a:rPr lang="en-US" dirty="0">
-                <a:hlinkClick r:id="rId3"/>
-              </a:rPr>
-              <a:t>config/hsc/processCcd.py</a:t>
-            </a:r>
+                <a:hlinkClick r:id="rId4"/>
+              </a:rPr>
+              <a:t>config/hsc/</a:t>
+            </a:r>
+            <a:r>
+              <a:rPr lang="en-US" dirty="0">
+                <a:hlinkClick r:id="rId4"/>
+              </a:rPr>
+              <a:t>processCcd.py</a:t>
+            </a:r>
+            <a:endParaRPr lang="en-US" dirty="0">
+              <a:hlinkClick r:id="rId5"/>
+            </a:endParaRPr>
           </a:p>
           <a:p>
             <a:endParaRPr lang="en-US" dirty="0"/>
@@ -2749,31 +2756,25 @@
               <a:t>Is loaded by </a:t>
             </a:r>
             <a:r>
-              <a:rPr lang="en-US" dirty="0" err="1" smtClean="0">
-                <a:hlinkClick r:id="rId3"/>
-              </a:rPr>
-              <a:t>obs_subaru</a:t>
-            </a:r>
-            <a:r>
               <a:rPr lang="en-US" dirty="0" smtClean="0">
                 <a:hlinkClick r:id="rId3"/>
               </a:rPr>
-              <a:t>/</a:t>
-            </a:r>
-            <a:r>
-              <a:rPr lang="en-US" dirty="0" err="1" smtClean="0">
-                <a:hlinkClick r:id="rId3"/>
-              </a:rPr>
-              <a:t>config</a:t>
+              <a:t>obs_subaru/</a:t>
             </a:r>
             <a:r>
               <a:rPr lang="en-US" dirty="0" smtClean="0">
                 <a:hlinkClick r:id="rId3"/>
               </a:rPr>
-              <a:t>/</a:t>
-            </a:r>
-            <a:r>
-              <a:rPr lang="en-US" dirty="0" err="1" smtClean="0">
+              <a:t>config/</a:t>
+            </a:r>
+            <a:r>
+              <a:rPr lang="en-US" smtClean="0">
+                <a:hlinkClick r:id="rId3"/>
+              </a:rPr>
+              <a:t>hsc/</a:t>
+            </a:r>
+            <a:r>
+              <a:rPr lang="en-US" dirty="0" smtClean="0">
                 <a:hlinkClick r:id="rId3"/>
               </a:rPr>
               <a:t>processCcd.py</a:t>
@@ -2914,8 +2915,13 @@
             </a:r>
             <a:r>
               <a:rPr lang="en-US" dirty="0"/>
-              <a:t>defect registry</a:t>
-            </a:r>
+              <a:t>defect </a:t>
+            </a:r>
+            <a:r>
+              <a:rPr lang="en-US" dirty="0" smtClean="0"/>
+              <a:t>registry giving the location of bad pixels</a:t>
+            </a:r>
+            <a:endParaRPr lang="en-US" dirty="0"/>
           </a:p>
           <a:p>
             <a:r>
@@ -3059,49 +3065,19 @@
             </a:r>
             <a:r>
               <a:rPr lang="en-US" dirty="0" smtClean="0"/>
-              <a:t>_* packages as a result, especially how data persistence:</a:t>
-            </a:r>
-          </a:p>
-          <a:p>
-            <a:r>
-              <a:rPr lang="en-US" dirty="0" smtClean="0"/>
-              <a:t>Dataset types should be much easier to add</a:t>
-            </a:r>
-          </a:p>
-          <a:p>
-            <a:r>
-              <a:rPr lang="en-US" dirty="0" smtClean="0"/>
-              <a:t>No need for a policy </a:t>
-            </a:r>
-            <a:r>
-              <a:rPr lang="en-US" dirty="0"/>
-              <a:t>file to describe the data</a:t>
-            </a:r>
-          </a:p>
-          <a:p>
-            <a:r>
-              <a:rPr lang="en-US" dirty="0" smtClean="0"/>
-              <a:t>The camera mapper will undergo significant changes</a:t>
-            </a:r>
-          </a:p>
-          <a:p>
-            <a:endParaRPr lang="en-US" dirty="0" smtClean="0"/>
-          </a:p>
-          <a:p>
-            <a:pPr marL="0" indent="0">
-              <a:buNone/>
-            </a:pPr>
-            <a:r>
-              <a:rPr lang="en-US" dirty="0" smtClean="0"/>
-              <a:t>The butler rewrite will not affect camera geometry (except details of </a:t>
-            </a:r>
-            <a:r>
-              <a:rPr lang="en-US" dirty="0" err="1" smtClean="0"/>
-              <a:t>unpersistance</a:t>
-            </a:r>
-            <a:r>
-              <a:rPr lang="en-US" dirty="0" smtClean="0"/>
-              <a:t>), camera-specific task configuration and camera-specific tasks.</a:t>
+              <a:t>_* packages as a result, </a:t>
+            </a:r>
+            <a:r>
+              <a:rPr lang="en-US" dirty="0" smtClean="0"/>
+              <a:t>including making it easier to </a:t>
+            </a:r>
+            <a:r>
+              <a:rPr lang="en-US" dirty="0" smtClean="0"/>
+              <a:t>add new dataset types</a:t>
+            </a:r>
+            <a:r>
+              <a:rPr lang="en-US" dirty="0" smtClean="0"/>
+              <a:t>.</a:t>
             </a:r>
           </a:p>
           <a:p>
@@ -3116,19 +3092,34 @@
             </a:pPr>
             <a:r>
               <a:rPr lang="en-US" dirty="0" smtClean="0"/>
-              <a:t>Meanwhile</a:t>
-            </a:r>
-            <a:r>
-              <a:rPr lang="en-US" smtClean="0"/>
-              <a:t>, this </a:t>
-            </a:r>
-            <a:r>
-              <a:rPr lang="en-US" dirty="0" smtClean="0"/>
-              <a:t>talk describes the current state </a:t>
-            </a:r>
-            <a:r>
-              <a:rPr lang="en-US" smtClean="0"/>
-              <a:t>of affairs…</a:t>
+              <a:t>The </a:t>
+            </a:r>
+            <a:r>
+              <a:rPr lang="en-US" dirty="0" smtClean="0"/>
+              <a:t>butler rewrite will not affect camera geometry (except details of </a:t>
+            </a:r>
+            <a:r>
+              <a:rPr lang="en-US" dirty="0" err="1" smtClean="0"/>
+              <a:t>unpersistance</a:t>
+            </a:r>
+            <a:r>
+              <a:rPr lang="en-US" dirty="0" smtClean="0"/>
+              <a:t>), camera-specific task configuration and camera-specific tasks.</a:t>
+            </a:r>
+          </a:p>
+          <a:p>
+            <a:pPr marL="0" indent="0">
+              <a:buNone/>
+            </a:pPr>
+            <a:endParaRPr lang="en-US" dirty="0" smtClean="0"/>
+          </a:p>
+          <a:p>
+            <a:pPr marL="0" indent="0">
+              <a:buNone/>
+            </a:pPr>
+            <a:r>
+              <a:rPr lang="en-US" dirty="0" smtClean="0"/>
+              <a:t>Meanwhile, this talk describes the current state of affairs…</a:t>
             </a:r>
             <a:endParaRPr lang="en-US" dirty="0"/>
           </a:p>
@@ -3307,14 +3298,14 @@
               <a:t>: </a:t>
             </a:r>
             <a:r>
-              <a:rPr lang="en-US" dirty="0" err="1" smtClean="0">
+              <a:rPr lang="en-US" dirty="0" smtClean="0">
                 <a:hlinkClick r:id="rId3"/>
               </a:rPr>
-              <a:t>HscMapper</a:t>
-            </a:r>
-            <a:r>
-              <a:rPr lang="en-US" dirty="0" smtClean="0"/>
-              <a:t> in </a:t>
+              <a:t>HscMapper </a:t>
+            </a:r>
+            <a:r>
+              <a:rPr lang="en-US" dirty="0" smtClean="0"/>
+              <a:t>in </a:t>
             </a:r>
             <a:r>
               <a:rPr lang="en-US" dirty="0" err="1" smtClean="0"/>
@@ -3426,8 +3417,20 @@
               <a:t>The </a:t>
             </a:r>
             <a:r>
-              <a:rPr lang="en-US" dirty="0"/>
-              <a:t>type, location and name for data of each supported “dataset </a:t>
+              <a:rPr lang="en-US" dirty="0" smtClean="0"/>
+              <a:t>type and </a:t>
+            </a:r>
+            <a:r>
+              <a:rPr lang="en-US" dirty="0"/>
+              <a:t>location </a:t>
+            </a:r>
+            <a:r>
+              <a:rPr lang="en-US" dirty="0" smtClean="0"/>
+              <a:t>of </a:t>
+            </a:r>
+            <a:r>
+              <a:rPr lang="en-US" dirty="0"/>
+              <a:t>each supported “dataset </a:t>
             </a:r>
             <a:r>
               <a:rPr lang="en-US" dirty="0" smtClean="0"/>
@@ -3535,13 +3538,7 @@
               <a:rPr lang="en-US" dirty="0">
                 <a:hlinkClick r:id="rId2"/>
               </a:rPr>
-              <a:t>/</a:t>
-            </a:r>
-            <a:r>
-              <a:rPr lang="en-US" dirty="0" err="1">
-                <a:hlinkClick r:id="rId2"/>
-              </a:rPr>
-              <a:t>lsstSimMapper.paf</a:t>
+              <a:t>/lsstSimMapper.paf</a:t>
             </a:r>
             <a:endParaRPr lang="en-US" dirty="0"/>
           </a:p>

</xml_diff>